<commit_message>
isa, assembly, instruction encoding
</commit_message>
<xml_diff>
--- a/Lec-3-6-ISA.pptx
+++ b/Lec-3-6-ISA.pptx
@@ -337,7 +337,7 @@
               <a:pPr>
                 <a:defRPr/>
               </a:pPr>
-              <a:t>1/14/2026</a:t>
+              <a:t>1/16/2026</a:t>
             </a:fld>
             <a:endParaRPr lang="en-US"/>
           </a:p>
@@ -18865,7 +18865,7 @@
                 <a:latin typeface="Ubuntu Mono" panose="020B0309030602030204" pitchFamily="49" charset="0"/>
                 <a:sym typeface="Wingdings" panose="05000000000000000000" pitchFamily="2" charset="2"/>
               </a:rPr>
-              <a:t> x1, x2, label          # if x1==x2, PC ← label else PC + 4</a:t>
+              <a:t> x1, x2, label        # if x1==x2, PC ← label else PC + 4</a:t>
             </a:r>
           </a:p>
           <a:p>
@@ -21204,7 +21204,11 @@
           </a:p>
           <a:p>
             <a:r>
-              <a:rPr lang="en-US" dirty="0"/>
+              <a:rPr lang="en-US" dirty="0">
+                <a:solidFill>
+                  <a:srgbClr val="FF0000"/>
+                </a:solidFill>
+              </a:rPr>
               <a:t>rs1, rs2 (5 bits each): source registers, or operands</a:t>
             </a:r>
           </a:p>
@@ -22063,7 +22067,11 @@
           </a:p>
           <a:p>
             <a:r>
-              <a:rPr lang="en-US" dirty="0"/>
+              <a:rPr lang="en-US" dirty="0">
+                <a:solidFill>
+                  <a:srgbClr val="FF0000"/>
+                </a:solidFill>
+              </a:rPr>
               <a:t>funct7: refines operation (e.g., add vs sub)</a:t>
             </a:r>
           </a:p>

</xml_diff>